<commit_message>
remove getinfo explicit function
</commit_message>
<xml_diff>
--- a/preparation/grip Task introduction.pptx
+++ b/preparation/grip Task introduction.pptx
@@ -5,16 +5,18 @@
     <p:sldMasterId id="2147483648" r:id="rId1"/>
   </p:sldMasterIdLst>
   <p:notesMasterIdLst>
-    <p:notesMasterId r:id="rId9"/>
+    <p:notesMasterId r:id="rId11"/>
   </p:notesMasterIdLst>
   <p:sldIdLst>
     <p:sldId id="256" r:id="rId2"/>
     <p:sldId id="262" r:id="rId3"/>
     <p:sldId id="261" r:id="rId4"/>
-    <p:sldId id="257" r:id="rId5"/>
-    <p:sldId id="258" r:id="rId6"/>
-    <p:sldId id="259" r:id="rId7"/>
-    <p:sldId id="260" r:id="rId8"/>
+    <p:sldId id="263" r:id="rId5"/>
+    <p:sldId id="264" r:id="rId6"/>
+    <p:sldId id="257" r:id="rId7"/>
+    <p:sldId id="258" r:id="rId8"/>
+    <p:sldId id="259" r:id="rId9"/>
+    <p:sldId id="260" r:id="rId10"/>
   </p:sldIdLst>
   <p:sldSz cx="12192000" cy="6858000"/>
   <p:notesSz cx="6858000" cy="9144000"/>
@@ -203,7 +205,7 @@
           <a:p>
             <a:fld id="{6088C1FB-E080-4820-8315-0CCA5F9EE695}" type="datetimeFigureOut">
               <a:rPr lang="zh-CN" altLang="en-US" smtClean="0"/>
-              <a:t>2019/6/28</a:t>
+              <a:t>2019/7/30</a:t>
             </a:fld>
             <a:endParaRPr lang="zh-CN" altLang="en-US"/>
           </a:p>
@@ -624,7 +626,7 @@
           <a:p>
             <a:fld id="{5DEAFFEA-D89F-46AB-852F-82E68CD598DE}" type="slidenum">
               <a:rPr lang="zh-CN" altLang="en-US" smtClean="0"/>
-              <a:t>5</a:t>
+              <a:t>7</a:t>
             </a:fld>
             <a:endParaRPr lang="zh-CN" altLang="en-US"/>
           </a:p>
@@ -712,7 +714,7 @@
           <a:p>
             <a:fld id="{5DEAFFEA-D89F-46AB-852F-82E68CD598DE}" type="slidenum">
               <a:rPr lang="zh-CN" altLang="en-US" smtClean="0"/>
-              <a:t>7</a:t>
+              <a:t>9</a:t>
             </a:fld>
             <a:endParaRPr lang="zh-CN" altLang="en-US"/>
           </a:p>
@@ -862,7 +864,7 @@
           <a:p>
             <a:fld id="{A735BFFC-1CC0-43C5-83D7-BC99F67516E4}" type="datetimeFigureOut">
               <a:rPr lang="zh-CN" altLang="en-US" smtClean="0"/>
-              <a:t>2019/6/28</a:t>
+              <a:t>2019/7/30</a:t>
             </a:fld>
             <a:endParaRPr lang="zh-CN" altLang="en-US"/>
           </a:p>
@@ -1032,7 +1034,7 @@
           <a:p>
             <a:fld id="{A735BFFC-1CC0-43C5-83D7-BC99F67516E4}" type="datetimeFigureOut">
               <a:rPr lang="zh-CN" altLang="en-US" smtClean="0"/>
-              <a:t>2019/6/28</a:t>
+              <a:t>2019/7/30</a:t>
             </a:fld>
             <a:endParaRPr lang="zh-CN" altLang="en-US"/>
           </a:p>
@@ -1212,7 +1214,7 @@
           <a:p>
             <a:fld id="{A735BFFC-1CC0-43C5-83D7-BC99F67516E4}" type="datetimeFigureOut">
               <a:rPr lang="zh-CN" altLang="en-US" smtClean="0"/>
-              <a:t>2019/6/28</a:t>
+              <a:t>2019/7/30</a:t>
             </a:fld>
             <a:endParaRPr lang="zh-CN" altLang="en-US"/>
           </a:p>
@@ -1382,7 +1384,7 @@
           <a:p>
             <a:fld id="{A735BFFC-1CC0-43C5-83D7-BC99F67516E4}" type="datetimeFigureOut">
               <a:rPr lang="zh-CN" altLang="en-US" smtClean="0"/>
-              <a:t>2019/6/28</a:t>
+              <a:t>2019/7/30</a:t>
             </a:fld>
             <a:endParaRPr lang="zh-CN" altLang="en-US"/>
           </a:p>
@@ -1628,7 +1630,7 @@
           <a:p>
             <a:fld id="{A735BFFC-1CC0-43C5-83D7-BC99F67516E4}" type="datetimeFigureOut">
               <a:rPr lang="zh-CN" altLang="en-US" smtClean="0"/>
-              <a:t>2019/6/28</a:t>
+              <a:t>2019/7/30</a:t>
             </a:fld>
             <a:endParaRPr lang="zh-CN" altLang="en-US"/>
           </a:p>
@@ -1860,7 +1862,7 @@
           <a:p>
             <a:fld id="{A735BFFC-1CC0-43C5-83D7-BC99F67516E4}" type="datetimeFigureOut">
               <a:rPr lang="zh-CN" altLang="en-US" smtClean="0"/>
-              <a:t>2019/6/28</a:t>
+              <a:t>2019/7/30</a:t>
             </a:fld>
             <a:endParaRPr lang="zh-CN" altLang="en-US"/>
           </a:p>
@@ -2227,7 +2229,7 @@
           <a:p>
             <a:fld id="{A735BFFC-1CC0-43C5-83D7-BC99F67516E4}" type="datetimeFigureOut">
               <a:rPr lang="zh-CN" altLang="en-US" smtClean="0"/>
-              <a:t>2019/6/28</a:t>
+              <a:t>2019/7/30</a:t>
             </a:fld>
             <a:endParaRPr lang="zh-CN" altLang="en-US"/>
           </a:p>
@@ -2345,7 +2347,7 @@
           <a:p>
             <a:fld id="{A735BFFC-1CC0-43C5-83D7-BC99F67516E4}" type="datetimeFigureOut">
               <a:rPr lang="zh-CN" altLang="en-US" smtClean="0"/>
-              <a:t>2019/6/28</a:t>
+              <a:t>2019/7/30</a:t>
             </a:fld>
             <a:endParaRPr lang="zh-CN" altLang="en-US"/>
           </a:p>
@@ -2440,7 +2442,7 @@
           <a:p>
             <a:fld id="{A735BFFC-1CC0-43C5-83D7-BC99F67516E4}" type="datetimeFigureOut">
               <a:rPr lang="zh-CN" altLang="en-US" smtClean="0"/>
-              <a:t>2019/6/28</a:t>
+              <a:t>2019/7/30</a:t>
             </a:fld>
             <a:endParaRPr lang="zh-CN" altLang="en-US"/>
           </a:p>
@@ -2717,7 +2719,7 @@
           <a:p>
             <a:fld id="{A735BFFC-1CC0-43C5-83D7-BC99F67516E4}" type="datetimeFigureOut">
               <a:rPr lang="zh-CN" altLang="en-US" smtClean="0"/>
-              <a:t>2019/6/28</a:t>
+              <a:t>2019/7/30</a:t>
             </a:fld>
             <a:endParaRPr lang="zh-CN" altLang="en-US"/>
           </a:p>
@@ -2970,7 +2972,7 @@
           <a:p>
             <a:fld id="{A735BFFC-1CC0-43C5-83D7-BC99F67516E4}" type="datetimeFigureOut">
               <a:rPr lang="zh-CN" altLang="en-US" smtClean="0"/>
-              <a:t>2019/6/28</a:t>
+              <a:t>2019/7/30</a:t>
             </a:fld>
             <a:endParaRPr lang="zh-CN" altLang="en-US"/>
           </a:p>
@@ -3183,7 +3185,7 @@
           <a:p>
             <a:fld id="{A735BFFC-1CC0-43C5-83D7-BC99F67516E4}" type="datetimeFigureOut">
               <a:rPr lang="zh-CN" altLang="en-US" smtClean="0"/>
-              <a:t>2019/6/28</a:t>
+              <a:t>2019/7/30</a:t>
             </a:fld>
             <a:endParaRPr lang="zh-CN" altLang="en-US"/>
           </a:p>
@@ -3685,30 +3687,273 @@
       </p:sp>
       <p:grpSp>
         <p:nvGrpSpPr>
-          <p:cNvPr id="17" name="组合 16"/>
+          <p:cNvPr id="3" name="组合 2"/>
           <p:cNvGrpSpPr/>
           <p:nvPr/>
         </p:nvGrpSpPr>
         <p:grpSpPr>
           <a:xfrm>
-            <a:off x="2318982" y="1926751"/>
-            <a:ext cx="7245278" cy="2796986"/>
-            <a:chOff x="2473361" y="2722398"/>
-            <a:chExt cx="7245278" cy="2796986"/>
+            <a:off x="2340499" y="3762124"/>
+            <a:ext cx="7107208" cy="1398493"/>
+            <a:chOff x="2318982" y="3325244"/>
+            <a:chExt cx="7107208" cy="1398493"/>
+          </a:xfrm>
+        </p:grpSpPr>
+        <p:sp>
+          <p:nvSpPr>
+            <p:cNvPr id="9" name="圆角矩形 8"/>
+            <p:cNvSpPr/>
+            <p:nvPr/>
+          </p:nvSpPr>
+          <p:spPr>
+            <a:xfrm>
+              <a:off x="2340499" y="3325244"/>
+              <a:ext cx="1565238" cy="699247"/>
+            </a:xfrm>
+            <a:prstGeom prst="roundRect">
+              <a:avLst/>
+            </a:prstGeom>
+          </p:spPr>
+          <p:style>
+            <a:lnRef idx="2">
+              <a:schemeClr val="accent1">
+                <a:shade val="50000"/>
+              </a:schemeClr>
+            </a:lnRef>
+            <a:fillRef idx="1">
+              <a:schemeClr val="accent1"/>
+            </a:fillRef>
+            <a:effectRef idx="0">
+              <a:schemeClr val="accent1"/>
+            </a:effectRef>
+            <a:fontRef idx="minor">
+              <a:schemeClr val="lt1"/>
+            </a:fontRef>
+          </p:style>
+          <p:txBody>
+            <a:bodyPr rtlCol="0" anchor="ctr"/>
+            <a:lstStyle/>
+            <a:p>
+              <a:pPr algn="ctr"/>
+              <a:r>
+                <a:rPr lang="en-US" altLang="zh-CN" dirty="0" err="1" smtClean="0"/>
+                <a:t>trythreshold</a:t>
+              </a:r>
+              <a:endParaRPr lang="zh-CN" altLang="en-US" dirty="0"/>
+            </a:p>
+          </p:txBody>
+        </p:sp>
+        <p:sp>
+          <p:nvSpPr>
+            <p:cNvPr id="10" name="矩形 9"/>
+            <p:cNvSpPr/>
+            <p:nvPr/>
+          </p:nvSpPr>
+          <p:spPr>
+            <a:xfrm>
+              <a:off x="3905737" y="3490200"/>
+              <a:ext cx="1632178" cy="369332"/>
+            </a:xfrm>
+            <a:prstGeom prst="rect">
+              <a:avLst/>
+            </a:prstGeom>
+          </p:spPr>
+          <p:txBody>
+            <a:bodyPr wrap="none">
+              <a:spAutoFit/>
+            </a:bodyPr>
+            <a:lstStyle/>
+            <a:p>
+              <a:r>
+                <a:rPr lang="zh-CN" altLang="en-US" dirty="0" smtClean="0"/>
+                <a:t>握力基础测量</a:t>
+              </a:r>
+              <a:r>
+                <a:rPr lang="en-US" altLang="zh-CN" dirty="0" smtClean="0"/>
+                <a:t> </a:t>
+              </a:r>
+              <a:endParaRPr lang="zh-CN" altLang="en-US" dirty="0"/>
+            </a:p>
+          </p:txBody>
+        </p:sp>
+        <p:sp>
+          <p:nvSpPr>
+            <p:cNvPr id="12" name="圆角矩形 11"/>
+            <p:cNvSpPr/>
+            <p:nvPr/>
+          </p:nvSpPr>
+          <p:spPr>
+            <a:xfrm>
+              <a:off x="2318982" y="4024490"/>
+              <a:ext cx="1398494" cy="699247"/>
+            </a:xfrm>
+            <a:prstGeom prst="roundRect">
+              <a:avLst/>
+            </a:prstGeom>
+          </p:spPr>
+          <p:style>
+            <a:lnRef idx="2">
+              <a:schemeClr val="accent1">
+                <a:shade val="50000"/>
+              </a:schemeClr>
+            </a:lnRef>
+            <a:fillRef idx="1">
+              <a:schemeClr val="accent1"/>
+            </a:fillRef>
+            <a:effectRef idx="0">
+              <a:schemeClr val="accent1"/>
+            </a:effectRef>
+            <a:fontRef idx="minor">
+              <a:schemeClr val="lt1"/>
+            </a:fontRef>
+          </p:style>
+          <p:txBody>
+            <a:bodyPr rtlCol="0" anchor="ctr"/>
+            <a:lstStyle/>
+            <a:p>
+              <a:pPr algn="ctr"/>
+              <a:r>
+                <a:rPr lang="en-US" altLang="zh-CN" dirty="0" err="1" smtClean="0"/>
+                <a:t>trymatch</a:t>
+              </a:r>
+              <a:endParaRPr lang="zh-CN" altLang="en-US" dirty="0"/>
+            </a:p>
+          </p:txBody>
+        </p:sp>
+        <p:sp>
+          <p:nvSpPr>
+            <p:cNvPr id="13" name="矩形 12"/>
+            <p:cNvSpPr/>
+            <p:nvPr/>
+          </p:nvSpPr>
+          <p:spPr>
+            <a:xfrm>
+              <a:off x="3717476" y="4200178"/>
+              <a:ext cx="2031325" cy="369332"/>
+            </a:xfrm>
+            <a:prstGeom prst="rect">
+              <a:avLst/>
+            </a:prstGeom>
+          </p:spPr>
+          <p:txBody>
+            <a:bodyPr wrap="none">
+              <a:spAutoFit/>
+            </a:bodyPr>
+            <a:lstStyle/>
+            <a:p>
+              <a:r>
+                <a:rPr lang="zh-CN" altLang="en-US" dirty="0" smtClean="0"/>
+                <a:t>测量声音同步延迟</a:t>
+              </a:r>
+              <a:endParaRPr lang="zh-CN" altLang="en-US" dirty="0"/>
+            </a:p>
+          </p:txBody>
+        </p:sp>
+        <p:sp>
+          <p:nvSpPr>
+            <p:cNvPr id="15" name="矩形 14"/>
+            <p:cNvSpPr/>
+            <p:nvPr/>
+          </p:nvSpPr>
+          <p:spPr>
+            <a:xfrm>
+              <a:off x="5779038" y="3864466"/>
+              <a:ext cx="3647152" cy="369332"/>
+            </a:xfrm>
+            <a:prstGeom prst="rect">
+              <a:avLst/>
+            </a:prstGeom>
+          </p:spPr>
+          <p:txBody>
+            <a:bodyPr wrap="none">
+              <a:spAutoFit/>
+            </a:bodyPr>
+            <a:lstStyle/>
+            <a:p>
+              <a:r>
+                <a:rPr lang="zh-CN" altLang="en-US" dirty="0" smtClean="0">
+                  <a:solidFill>
+                    <a:schemeClr val="accent1"/>
+                  </a:solidFill>
+                </a:rPr>
+                <a:t>若</a:t>
+              </a:r>
+              <a:r>
+                <a:rPr lang="zh-CN" altLang="en-US" dirty="0">
+                  <a:solidFill>
+                    <a:schemeClr val="accent1"/>
+                  </a:solidFill>
+                </a:rPr>
+                <a:t>不换人，不换机器，不用重新测</a:t>
+              </a:r>
+            </a:p>
+          </p:txBody>
+        </p:sp>
+        <p:sp>
+          <p:nvSpPr>
+            <p:cNvPr id="16" name="右大括号 15"/>
+            <p:cNvSpPr/>
+            <p:nvPr/>
+          </p:nvSpPr>
+          <p:spPr>
+            <a:xfrm>
+              <a:off x="5590777" y="3612974"/>
+              <a:ext cx="158024" cy="848984"/>
+            </a:xfrm>
+            <a:prstGeom prst="rightBrace">
+              <a:avLst/>
+            </a:prstGeom>
+          </p:spPr>
+          <p:style>
+            <a:lnRef idx="1">
+              <a:schemeClr val="accent1"/>
+            </a:lnRef>
+            <a:fillRef idx="0">
+              <a:schemeClr val="accent1"/>
+            </a:fillRef>
+            <a:effectRef idx="0">
+              <a:schemeClr val="accent1"/>
+            </a:effectRef>
+            <a:fontRef idx="minor">
+              <a:schemeClr val="tx1"/>
+            </a:fontRef>
+          </p:style>
+          <p:txBody>
+            <a:bodyPr rtlCol="0" anchor="ctr"/>
+            <a:lstStyle/>
+            <a:p>
+              <a:pPr algn="ctr"/>
+              <a:endParaRPr lang="zh-CN" altLang="en-US"/>
+            </a:p>
+          </p:txBody>
+        </p:sp>
+      </p:grpSp>
+      <p:grpSp>
+        <p:nvGrpSpPr>
+          <p:cNvPr id="22" name="组合 21"/>
+          <p:cNvGrpSpPr/>
+          <p:nvPr/>
+        </p:nvGrpSpPr>
+        <p:grpSpPr>
+          <a:xfrm>
+            <a:off x="2362016" y="1576647"/>
+            <a:ext cx="7223761" cy="2020518"/>
+            <a:chOff x="2383051" y="1300480"/>
+            <a:chExt cx="7223761" cy="2020518"/>
           </a:xfrm>
         </p:grpSpPr>
         <p:grpSp>
           <p:nvGrpSpPr>
-            <p:cNvPr id="4" name="组合 3"/>
+            <p:cNvPr id="18" name="组合 17"/>
             <p:cNvGrpSpPr/>
             <p:nvPr/>
           </p:nvGrpSpPr>
           <p:grpSpPr>
             <a:xfrm>
-              <a:off x="2473361" y="2722398"/>
-              <a:ext cx="7245278" cy="2796986"/>
-              <a:chOff x="1554476" y="3981182"/>
-              <a:chExt cx="7245278" cy="2796986"/>
+              <a:off x="2383051" y="1421199"/>
+              <a:ext cx="7223761" cy="1899799"/>
+              <a:chOff x="2340499" y="1425445"/>
+              <a:chExt cx="7223761" cy="1899799"/>
             </a:xfrm>
           </p:grpSpPr>
           <p:sp>
@@ -3719,7 +3964,7 @@
             </p:nvSpPr>
             <p:spPr>
               <a:xfrm>
-                <a:off x="1575993" y="3981182"/>
+                <a:off x="2340499" y="1926751"/>
                 <a:ext cx="1398494" cy="699247"/>
               </a:xfrm>
               <a:prstGeom prst="roundRect">
@@ -3763,7 +4008,7 @@
             </p:nvSpPr>
             <p:spPr>
               <a:xfrm>
-                <a:off x="1575993" y="4680428"/>
+                <a:off x="2340499" y="2625997"/>
                 <a:ext cx="1398494" cy="699247"/>
               </a:xfrm>
               <a:prstGeom prst="roundRect">
@@ -3807,7 +4052,7 @@
             </p:nvSpPr>
             <p:spPr>
               <a:xfrm>
-                <a:off x="2974487" y="4146139"/>
+                <a:off x="3738993" y="2091708"/>
                 <a:ext cx="1731981" cy="369332"/>
               </a:xfrm>
               <a:prstGeom prst="rect">
@@ -3837,7 +4082,7 @@
             </p:nvSpPr>
             <p:spPr>
               <a:xfrm>
-                <a:off x="2974487" y="4845385"/>
+                <a:off x="3738993" y="2790954"/>
                 <a:ext cx="1731981" cy="369332"/>
               </a:xfrm>
               <a:prstGeom prst="rect">
@@ -3861,90 +4106,13 @@
           </p:sp>
           <p:sp>
             <p:nvSpPr>
-              <p:cNvPr id="9" name="圆角矩形 8"/>
-              <p:cNvSpPr/>
-              <p:nvPr/>
-            </p:nvSpPr>
-            <p:spPr>
-              <a:xfrm>
-                <a:off x="1575993" y="5379675"/>
-                <a:ext cx="1565238" cy="699247"/>
-              </a:xfrm>
-              <a:prstGeom prst="roundRect">
-                <a:avLst/>
-              </a:prstGeom>
-            </p:spPr>
-            <p:style>
-              <a:lnRef idx="2">
-                <a:schemeClr val="accent1">
-                  <a:shade val="50000"/>
-                </a:schemeClr>
-              </a:lnRef>
-              <a:fillRef idx="1">
-                <a:schemeClr val="accent1"/>
-              </a:fillRef>
-              <a:effectRef idx="0">
-                <a:schemeClr val="accent1"/>
-              </a:effectRef>
-              <a:fontRef idx="minor">
-                <a:schemeClr val="lt1"/>
-              </a:fontRef>
-            </p:style>
-            <p:txBody>
-              <a:bodyPr rtlCol="0" anchor="ctr"/>
-              <a:lstStyle/>
-              <a:p>
-                <a:pPr algn="ctr"/>
-                <a:r>
-                  <a:rPr lang="en-US" altLang="zh-CN" dirty="0" err="1" smtClean="0"/>
-                  <a:t>trythreshold</a:t>
-                </a:r>
-                <a:endParaRPr lang="zh-CN" altLang="en-US" dirty="0"/>
-              </a:p>
-            </p:txBody>
-          </p:sp>
-          <p:sp>
-            <p:nvSpPr>
-              <p:cNvPr id="10" name="矩形 9"/>
-              <p:cNvSpPr/>
-              <p:nvPr/>
-            </p:nvSpPr>
-            <p:spPr>
-              <a:xfrm>
-                <a:off x="3141231" y="5544631"/>
-                <a:ext cx="1632178" cy="369332"/>
-              </a:xfrm>
-              <a:prstGeom prst="rect">
-                <a:avLst/>
-              </a:prstGeom>
-            </p:spPr>
-            <p:txBody>
-              <a:bodyPr wrap="none">
-                <a:spAutoFit/>
-              </a:bodyPr>
-              <a:lstStyle/>
-              <a:p>
-                <a:r>
-                  <a:rPr lang="zh-CN" altLang="en-US" dirty="0" smtClean="0"/>
-                  <a:t>握力基础测量</a:t>
-                </a:r>
-                <a:r>
-                  <a:rPr lang="en-US" altLang="zh-CN" dirty="0" smtClean="0"/>
-                  <a:t> </a:t>
-                </a:r>
-                <a:endParaRPr lang="zh-CN" altLang="en-US" dirty="0"/>
-              </a:p>
-            </p:txBody>
-          </p:sp>
-          <p:sp>
-            <p:nvSpPr>
               <p:cNvPr id="11" name="文本框 10"/>
               <p:cNvSpPr txBox="1"/>
               <p:nvPr/>
             </p:nvSpPr>
             <p:spPr>
               <a:xfrm>
-                <a:off x="4826271" y="4680428"/>
+                <a:off x="5590777" y="2625997"/>
                 <a:ext cx="3973483" cy="646331"/>
               </a:xfrm>
               <a:prstGeom prst="rect">
@@ -4001,86 +4169,13 @@
           </p:sp>
           <p:sp>
             <p:nvSpPr>
-              <p:cNvPr id="12" name="圆角矩形 11"/>
-              <p:cNvSpPr/>
-              <p:nvPr/>
-            </p:nvSpPr>
-            <p:spPr>
-              <a:xfrm>
-                <a:off x="1554476" y="6078921"/>
-                <a:ext cx="1398494" cy="699247"/>
-              </a:xfrm>
-              <a:prstGeom prst="roundRect">
-                <a:avLst/>
-              </a:prstGeom>
-            </p:spPr>
-            <p:style>
-              <a:lnRef idx="2">
-                <a:schemeClr val="accent1">
-                  <a:shade val="50000"/>
-                </a:schemeClr>
-              </a:lnRef>
-              <a:fillRef idx="1">
-                <a:schemeClr val="accent1"/>
-              </a:fillRef>
-              <a:effectRef idx="0">
-                <a:schemeClr val="accent1"/>
-              </a:effectRef>
-              <a:fontRef idx="minor">
-                <a:schemeClr val="lt1"/>
-              </a:fontRef>
-            </p:style>
-            <p:txBody>
-              <a:bodyPr rtlCol="0" anchor="ctr"/>
-              <a:lstStyle/>
-              <a:p>
-                <a:pPr algn="ctr"/>
-                <a:r>
-                  <a:rPr lang="en-US" altLang="zh-CN" dirty="0" err="1" smtClean="0"/>
-                  <a:t>trymatch</a:t>
-                </a:r>
-                <a:endParaRPr lang="zh-CN" altLang="en-US" dirty="0"/>
-              </a:p>
-            </p:txBody>
-          </p:sp>
-          <p:sp>
-            <p:nvSpPr>
-              <p:cNvPr id="13" name="矩形 12"/>
-              <p:cNvSpPr/>
-              <p:nvPr/>
-            </p:nvSpPr>
-            <p:spPr>
-              <a:xfrm>
-                <a:off x="2952970" y="6254609"/>
-                <a:ext cx="2031325" cy="369332"/>
-              </a:xfrm>
-              <a:prstGeom prst="rect">
-                <a:avLst/>
-              </a:prstGeom>
-            </p:spPr>
-            <p:txBody>
-              <a:bodyPr wrap="none">
-                <a:spAutoFit/>
-              </a:bodyPr>
-              <a:lstStyle/>
-              <a:p>
-                <a:r>
-                  <a:rPr lang="zh-CN" altLang="en-US" dirty="0" smtClean="0"/>
-                  <a:t>测量声音同步延迟</a:t>
-                </a:r>
-                <a:endParaRPr lang="zh-CN" altLang="en-US" dirty="0"/>
-              </a:p>
-            </p:txBody>
-          </p:sp>
-          <p:sp>
-            <p:nvSpPr>
               <p:cNvPr id="14" name="文本框 13"/>
               <p:cNvSpPr txBox="1"/>
               <p:nvPr/>
             </p:nvSpPr>
             <p:spPr>
               <a:xfrm>
-                <a:off x="4826271" y="4162971"/>
+                <a:off x="5590777" y="2108540"/>
                 <a:ext cx="3973483" cy="369332"/>
               </a:xfrm>
               <a:prstGeom prst="rect">
@@ -4123,74 +4218,70 @@
               </a:p>
             </p:txBody>
           </p:sp>
+          <p:sp>
+            <p:nvSpPr>
+              <p:cNvPr id="21" name="文本框 20"/>
+              <p:cNvSpPr txBox="1"/>
+              <p:nvPr/>
+            </p:nvSpPr>
+            <p:spPr>
+              <a:xfrm>
+                <a:off x="3738993" y="1425445"/>
+                <a:ext cx="1731981" cy="369332"/>
+              </a:xfrm>
+              <a:prstGeom prst="rect">
+                <a:avLst/>
+              </a:prstGeom>
+              <a:noFill/>
+            </p:spPr>
+            <p:txBody>
+              <a:bodyPr wrap="square" rtlCol="0">
+                <a:spAutoFit/>
+              </a:bodyPr>
+              <a:lstStyle/>
+              <a:p>
+                <a:r>
+                  <a:rPr lang="zh-CN" altLang="en-US" dirty="0" smtClean="0"/>
+                  <a:t>打开</a:t>
+                </a:r>
+                <a:r>
+                  <a:rPr lang="en-US" altLang="zh-CN" dirty="0" err="1" smtClean="0"/>
+                  <a:t>pmode</a:t>
+                </a:r>
+                <a:endParaRPr lang="zh-CN" altLang="en-US" dirty="0"/>
+              </a:p>
+            </p:txBody>
+          </p:sp>
         </p:grpSp>
         <p:sp>
           <p:nvSpPr>
-            <p:cNvPr id="15" name="矩形 14"/>
+            <p:cNvPr id="19" name="圆角矩形 18"/>
             <p:cNvSpPr/>
             <p:nvPr/>
           </p:nvSpPr>
           <p:spPr>
             <a:xfrm>
-              <a:off x="5933417" y="4660113"/>
-              <a:ext cx="3647152" cy="369332"/>
+              <a:off x="2383051" y="1300480"/>
+              <a:ext cx="1398493" cy="610771"/>
             </a:xfrm>
-            <a:prstGeom prst="rect">
-              <a:avLst/>
-            </a:prstGeom>
-          </p:spPr>
-          <p:txBody>
-            <a:bodyPr wrap="none">
-              <a:spAutoFit/>
-            </a:bodyPr>
-            <a:lstStyle/>
-            <a:p>
-              <a:r>
-                <a:rPr lang="zh-CN" altLang="en-US" dirty="0" smtClean="0">
-                  <a:solidFill>
-                    <a:schemeClr val="accent1"/>
-                  </a:solidFill>
-                </a:rPr>
-                <a:t>若</a:t>
-              </a:r>
-              <a:r>
-                <a:rPr lang="zh-CN" altLang="en-US" dirty="0">
-                  <a:solidFill>
-                    <a:schemeClr val="accent1"/>
-                  </a:solidFill>
-                </a:rPr>
-                <a:t>不换人，不换机器，不用重新测</a:t>
-              </a:r>
-            </a:p>
-          </p:txBody>
-        </p:sp>
-        <p:sp>
-          <p:nvSpPr>
-            <p:cNvPr id="16" name="右大括号 15"/>
-            <p:cNvSpPr/>
-            <p:nvPr/>
-          </p:nvSpPr>
-          <p:spPr>
-            <a:xfrm>
-              <a:off x="5745156" y="4408621"/>
-              <a:ext cx="158024" cy="848984"/>
-            </a:xfrm>
-            <a:prstGeom prst="rightBrace">
+            <a:prstGeom prst="roundRect">
               <a:avLst/>
             </a:prstGeom>
           </p:spPr>
           <p:style>
-            <a:lnRef idx="1">
-              <a:schemeClr val="accent1"/>
+            <a:lnRef idx="2">
+              <a:schemeClr val="accent1">
+                <a:shade val="50000"/>
+              </a:schemeClr>
             </a:lnRef>
-            <a:fillRef idx="0">
+            <a:fillRef idx="1">
               <a:schemeClr val="accent1"/>
             </a:fillRef>
             <a:effectRef idx="0">
               <a:schemeClr val="accent1"/>
             </a:effectRef>
             <a:fontRef idx="minor">
-              <a:schemeClr val="tx1"/>
+              <a:schemeClr val="lt1"/>
             </a:fontRef>
           </p:style>
           <p:txBody>
@@ -4198,7 +4289,11 @@
             <a:lstStyle/>
             <a:p>
               <a:pPr algn="ctr"/>
-              <a:endParaRPr lang="zh-CN" altLang="en-US"/>
+              <a:r>
+                <a:rPr lang="en-US" altLang="zh-CN" dirty="0" smtClean="0"/>
+                <a:t>start0</a:t>
+              </a:r>
+              <a:endParaRPr lang="zh-CN" altLang="en-US" dirty="0"/>
             </a:p>
           </p:txBody>
         </p:sp>
@@ -4273,7 +4368,7 @@
         <p:spPr>
           <a:xfrm>
             <a:off x="838200" y="1825625"/>
-            <a:ext cx="3591296" cy="4351338"/>
+            <a:ext cx="6215739" cy="3051175"/>
           </a:xfrm>
         </p:spPr>
         <p:txBody>
@@ -4304,36 +4399,74 @@
               <a:t>2. </a:t>
             </a:r>
             <a:r>
-              <a:rPr lang="en-US" altLang="zh-CN" dirty="0" err="1" smtClean="0"/>
-              <a:t>pmode_trymatch</a:t>
-            </a:r>
-            <a:endParaRPr lang="en-US" altLang="zh-CN" dirty="0" smtClean="0"/>
+              <a:rPr lang="en-US" altLang="zh-CN" dirty="0" err="1" smtClean="0">
+                <a:solidFill>
+                  <a:schemeClr val="accent6"/>
+                </a:solidFill>
+              </a:rPr>
+              <a:t>trymatch_pmode</a:t>
+            </a:r>
+            <a:endParaRPr lang="en-US" altLang="zh-CN" dirty="0" smtClean="0">
+              <a:solidFill>
+                <a:schemeClr val="accent6"/>
+              </a:solidFill>
+            </a:endParaRPr>
           </a:p>
           <a:p>
             <a:pPr lvl="1"/>
             <a:r>
-              <a:rPr lang="en-US" altLang="zh-CN" dirty="0" smtClean="0"/>
+              <a:rPr lang="en-US" altLang="zh-CN" dirty="0" smtClean="0">
+                <a:solidFill>
+                  <a:schemeClr val="accent1">
+                    <a:lumMod val="75000"/>
+                  </a:schemeClr>
+                </a:solidFill>
+              </a:rPr>
               <a:t>3. trymatch_f1</a:t>
             </a:r>
           </a:p>
           <a:p>
             <a:pPr lvl="1"/>
             <a:r>
-              <a:rPr lang="en-US" altLang="zh-CN" dirty="0" smtClean="0"/>
+              <a:rPr lang="en-US" altLang="zh-CN" dirty="0" smtClean="0">
+                <a:solidFill>
+                  <a:schemeClr val="accent1">
+                    <a:lumMod val="75000"/>
+                  </a:schemeClr>
+                </a:solidFill>
+              </a:rPr>
               <a:t>4. trymatch_f2</a:t>
             </a:r>
           </a:p>
           <a:p>
             <a:pPr lvl="1"/>
             <a:r>
-              <a:rPr lang="en-US" altLang="zh-CN" dirty="0" smtClean="0"/>
+              <a:rPr lang="en-US" altLang="zh-CN" dirty="0" smtClean="0">
+                <a:solidFill>
+                  <a:schemeClr val="accent1">
+                    <a:lumMod val="75000"/>
+                  </a:schemeClr>
+                </a:solidFill>
+              </a:rPr>
               <a:t>5. </a:t>
             </a:r>
             <a:r>
-              <a:rPr lang="en-US" altLang="zh-CN" dirty="0" err="1" smtClean="0"/>
+              <a:rPr lang="en-US" altLang="zh-CN" dirty="0" err="1" smtClean="0">
+                <a:solidFill>
+                  <a:schemeClr val="accent1">
+                    <a:lumMod val="75000"/>
+                  </a:schemeClr>
+                </a:solidFill>
+              </a:rPr>
               <a:t>trymatch_key</a:t>
             </a:r>
-            <a:endParaRPr lang="en-US" altLang="zh-CN" dirty="0" smtClean="0"/>
+            <a:endParaRPr lang="en-US" altLang="zh-CN" dirty="0" smtClean="0">
+              <a:solidFill>
+                <a:schemeClr val="accent1">
+                  <a:lumMod val="75000"/>
+                </a:schemeClr>
+              </a:solidFill>
+            </a:endParaRPr>
           </a:p>
           <a:p>
             <a:pPr lvl="1"/>
@@ -4344,6 +4477,18 @@
             <a:r>
               <a:rPr lang="en-US" altLang="zh-CN" dirty="0" err="1" smtClean="0"/>
               <a:t>analysis_lag</a:t>
+            </a:r>
+            <a:r>
+              <a:rPr lang="zh-CN" altLang="en-US" dirty="0" smtClean="0"/>
+              <a:t>（演示</a:t>
+            </a:r>
+            <a:r>
+              <a:rPr lang="en-US" altLang="zh-CN" dirty="0" smtClean="0"/>
+              <a:t>lag</a:t>
+            </a:r>
+            <a:r>
+              <a:rPr lang="zh-CN" altLang="en-US" dirty="0" smtClean="0"/>
+              <a:t>拟合）</a:t>
             </a:r>
             <a:endParaRPr lang="zh-CN" altLang="en-US" dirty="0"/>
           </a:p>
@@ -4876,6 +5021,44 @@
           </a:prstGeom>
         </p:spPr>
       </p:pic>
+      <p:sp>
+        <p:nvSpPr>
+          <p:cNvPr id="5" name="文本框 4"/>
+          <p:cNvSpPr txBox="1"/>
+          <p:nvPr/>
+        </p:nvSpPr>
+        <p:spPr>
+          <a:xfrm>
+            <a:off x="1073857" y="5114721"/>
+            <a:ext cx="9133840" cy="369332"/>
+          </a:xfrm>
+          <a:prstGeom prst="rect">
+            <a:avLst/>
+          </a:prstGeom>
+          <a:noFill/>
+        </p:spPr>
+        <p:txBody>
+          <a:bodyPr wrap="square" rtlCol="0">
+            <a:spAutoFit/>
+          </a:bodyPr>
+          <a:lstStyle/>
+          <a:p>
+            <a:r>
+              <a:rPr lang="en-US" altLang="zh-CN" dirty="0" smtClean="0"/>
+              <a:t>Note : 1.6 in normal command prompt; 2 in </a:t>
+            </a:r>
+            <a:r>
+              <a:rPr lang="en-US" altLang="zh-CN" dirty="0" err="1" smtClean="0"/>
+              <a:t>pmode</a:t>
+            </a:r>
+            <a:r>
+              <a:rPr lang="en-US" altLang="zh-CN" dirty="0" smtClean="0"/>
+              <a:t> command;  others are callback</a:t>
+            </a:r>
+            <a:endParaRPr lang="zh-CN" altLang="en-US" dirty="0"/>
+          </a:p>
+        </p:txBody>
+      </p:sp>
     </p:spTree>
     <p:extLst>
       <p:ext uri="{BB962C8B-B14F-4D97-AF65-F5344CB8AC3E}">
@@ -4890,6 +5073,272 @@
 </file>
 
 <file path=ppt/slides/slide4.xml><?xml version="1.0" encoding="utf-8"?>
+<p:sld xmlns:a="http://schemas.openxmlformats.org/drawingml/2006/main" xmlns:r="http://schemas.openxmlformats.org/officeDocument/2006/relationships" xmlns:p="http://schemas.openxmlformats.org/presentationml/2006/main">
+  <p:cSld>
+    <p:spTree>
+      <p:nvGrpSpPr>
+        <p:cNvPr id="1" name=""/>
+        <p:cNvGrpSpPr/>
+        <p:nvPr/>
+      </p:nvGrpSpPr>
+      <p:grpSpPr>
+        <a:xfrm>
+          <a:off x="0" y="0"/>
+          <a:ext cx="0" cy="0"/>
+          <a:chOff x="0" y="0"/>
+          <a:chExt cx="0" cy="0"/>
+        </a:xfrm>
+      </p:grpSpPr>
+      <p:sp>
+        <p:nvSpPr>
+          <p:cNvPr id="2" name="标题 1"/>
+          <p:cNvSpPr>
+            <a:spLocks noGrp="1"/>
+          </p:cNvSpPr>
+          <p:nvPr>
+            <p:ph type="title"/>
+          </p:nvPr>
+        </p:nvSpPr>
+        <p:spPr/>
+        <p:txBody>
+          <a:bodyPr/>
+          <a:lstStyle/>
+          <a:p>
+            <a:r>
+              <a:rPr lang="en-US" altLang="zh-CN" dirty="0" smtClean="0"/>
+              <a:t>practice</a:t>
+            </a:r>
+            <a:endParaRPr lang="zh-CN" altLang="en-US" dirty="0"/>
+          </a:p>
+        </p:txBody>
+      </p:sp>
+      <p:sp>
+        <p:nvSpPr>
+          <p:cNvPr id="3" name="内容占位符 2"/>
+          <p:cNvSpPr>
+            <a:spLocks noGrp="1"/>
+          </p:cNvSpPr>
+          <p:nvPr>
+            <p:ph idx="1"/>
+          </p:nvPr>
+        </p:nvSpPr>
+        <p:spPr/>
+        <p:txBody>
+          <a:bodyPr/>
+          <a:lstStyle/>
+          <a:p>
+            <a:r>
+              <a:rPr lang="en-US" altLang="zh-CN" dirty="0" smtClean="0"/>
+              <a:t>1. </a:t>
+            </a:r>
+            <a:r>
+              <a:rPr lang="en-US" altLang="zh-CN" dirty="0" err="1" smtClean="0"/>
+              <a:t>pNoSound</a:t>
+            </a:r>
+            <a:r>
+              <a:rPr lang="en-US" altLang="zh-CN" dirty="0" smtClean="0"/>
+              <a:t>(</a:t>
+            </a:r>
+            <a:r>
+              <a:rPr lang="zh-CN" altLang="en-US" dirty="0" smtClean="0"/>
+              <a:t>没有声音，主命令行直接运行）</a:t>
+            </a:r>
+            <a:endParaRPr lang="en-US" altLang="zh-CN" dirty="0" smtClean="0"/>
+          </a:p>
+          <a:p>
+            <a:r>
+              <a:rPr lang="en-US" altLang="zh-CN" dirty="0" smtClean="0"/>
+              <a:t>2. </a:t>
+            </a:r>
+            <a:r>
+              <a:rPr lang="zh-CN" altLang="en-US" dirty="0" smtClean="0"/>
+              <a:t>有声音节奏的练习</a:t>
+            </a:r>
+            <a:endParaRPr lang="en-US" altLang="zh-CN" dirty="0" smtClean="0"/>
+          </a:p>
+          <a:p>
+            <a:pPr lvl="1"/>
+            <a:r>
+              <a:rPr lang="en-US" altLang="zh-CN" dirty="0" err="1" smtClean="0"/>
+              <a:t>pSound_start</a:t>
+            </a:r>
+            <a:r>
+              <a:rPr lang="en-US" altLang="zh-CN" dirty="0" smtClean="0"/>
+              <a:t>(</a:t>
+            </a:r>
+            <a:r>
+              <a:rPr lang="zh-CN" altLang="en-US" dirty="0" smtClean="0"/>
+              <a:t>输入编号）</a:t>
+            </a:r>
+            <a:endParaRPr lang="en-US" altLang="zh-CN" dirty="0" smtClean="0"/>
+          </a:p>
+          <a:p>
+            <a:pPr lvl="1"/>
+            <a:r>
+              <a:rPr lang="en-US" altLang="zh-CN" dirty="0" err="1" smtClean="0">
+                <a:solidFill>
+                  <a:schemeClr val="accent6"/>
+                </a:solidFill>
+              </a:rPr>
+              <a:t>pSound_pmode</a:t>
+            </a:r>
+            <a:r>
+              <a:rPr lang="zh-CN" altLang="en-US" dirty="0" smtClean="0"/>
+              <a:t> </a:t>
+            </a:r>
+            <a:r>
+              <a:rPr lang="en-US" altLang="zh-CN" dirty="0" smtClean="0"/>
+              <a:t>(</a:t>
+            </a:r>
+            <a:r>
+              <a:rPr lang="en-US" altLang="zh-CN" dirty="0" err="1" smtClean="0"/>
+              <a:t>pmode</a:t>
+            </a:r>
+            <a:r>
+              <a:rPr lang="zh-CN" altLang="en-US" dirty="0" smtClean="0"/>
+              <a:t>命令行）</a:t>
+            </a:r>
+            <a:endParaRPr lang="zh-CN" altLang="en-US" dirty="0"/>
+          </a:p>
+        </p:txBody>
+      </p:sp>
+    </p:spTree>
+    <p:extLst>
+      <p:ext uri="{BB962C8B-B14F-4D97-AF65-F5344CB8AC3E}">
+        <p14:creationId xmlns:p14="http://schemas.microsoft.com/office/powerpoint/2010/main" val="739295874"/>
+      </p:ext>
+    </p:extLst>
+  </p:cSld>
+  <p:clrMapOvr>
+    <a:masterClrMapping/>
+  </p:clrMapOvr>
+</p:sld>
+</file>
+
+<file path=ppt/slides/slide5.xml><?xml version="1.0" encoding="utf-8"?>
+<p:sld xmlns:a="http://schemas.openxmlformats.org/drawingml/2006/main" xmlns:r="http://schemas.openxmlformats.org/officeDocument/2006/relationships" xmlns:p="http://schemas.openxmlformats.org/presentationml/2006/main">
+  <p:cSld>
+    <p:spTree>
+      <p:nvGrpSpPr>
+        <p:cNvPr id="1" name=""/>
+        <p:cNvGrpSpPr/>
+        <p:nvPr/>
+      </p:nvGrpSpPr>
+      <p:grpSpPr>
+        <a:xfrm>
+          <a:off x="0" y="0"/>
+          <a:ext cx="0" cy="0"/>
+          <a:chOff x="0" y="0"/>
+          <a:chExt cx="0" cy="0"/>
+        </a:xfrm>
+      </p:grpSpPr>
+      <p:sp>
+        <p:nvSpPr>
+          <p:cNvPr id="2" name="标题 1"/>
+          <p:cNvSpPr>
+            <a:spLocks noGrp="1"/>
+          </p:cNvSpPr>
+          <p:nvPr>
+            <p:ph type="title"/>
+          </p:nvPr>
+        </p:nvSpPr>
+        <p:spPr/>
+        <p:txBody>
+          <a:bodyPr/>
+          <a:lstStyle/>
+          <a:p>
+            <a:r>
+              <a:rPr lang="en-US" altLang="zh-CN" dirty="0" smtClean="0"/>
+              <a:t>main</a:t>
+            </a:r>
+            <a:endParaRPr lang="zh-CN" altLang="en-US" dirty="0"/>
+          </a:p>
+        </p:txBody>
+      </p:sp>
+      <p:sp>
+        <p:nvSpPr>
+          <p:cNvPr id="3" name="内容占位符 2"/>
+          <p:cNvSpPr>
+            <a:spLocks noGrp="1"/>
+          </p:cNvSpPr>
+          <p:nvPr>
+            <p:ph idx="1"/>
+          </p:nvPr>
+        </p:nvSpPr>
+        <p:spPr/>
+        <p:txBody>
+          <a:bodyPr/>
+          <a:lstStyle/>
+          <a:p>
+            <a:r>
+              <a:rPr lang="en-US" altLang="zh-CN" dirty="0" err="1" smtClean="0"/>
+              <a:t>m_start</a:t>
+            </a:r>
+            <a:r>
+              <a:rPr lang="en-US" altLang="zh-CN" dirty="0" smtClean="0"/>
+              <a:t> (</a:t>
+            </a:r>
+            <a:r>
+              <a:rPr lang="zh-CN" altLang="en-US" dirty="0" smtClean="0"/>
+              <a:t>输入编号）</a:t>
+            </a:r>
+            <a:endParaRPr lang="en-US" altLang="zh-CN" dirty="0" smtClean="0"/>
+          </a:p>
+          <a:p>
+            <a:r>
+              <a:rPr lang="en-US" altLang="zh-CN" dirty="0" err="1" smtClean="0">
+                <a:solidFill>
+                  <a:schemeClr val="accent6"/>
+                </a:solidFill>
+              </a:rPr>
+              <a:t>M_pmode</a:t>
+            </a:r>
+            <a:r>
+              <a:rPr lang="en-US" altLang="zh-CN" dirty="0" smtClean="0">
+                <a:solidFill>
+                  <a:schemeClr val="accent6"/>
+                </a:solidFill>
+              </a:rPr>
+              <a:t>(</a:t>
+            </a:r>
+            <a:r>
+              <a:rPr lang="en-US" altLang="zh-CN" dirty="0" err="1" smtClean="0">
+                <a:solidFill>
+                  <a:schemeClr val="accent6"/>
+                </a:solidFill>
+              </a:rPr>
+              <a:t>pmode</a:t>
+            </a:r>
+            <a:r>
+              <a:rPr lang="zh-CN" altLang="en-US" dirty="0" smtClean="0">
+                <a:solidFill>
+                  <a:schemeClr val="accent6"/>
+                </a:solidFill>
+              </a:rPr>
+              <a:t>命令行）</a:t>
+            </a:r>
+            <a:endParaRPr lang="zh-CN" altLang="en-US" dirty="0">
+              <a:solidFill>
+                <a:schemeClr val="accent6"/>
+              </a:solidFill>
+            </a:endParaRPr>
+          </a:p>
+        </p:txBody>
+      </p:sp>
+    </p:spTree>
+    <p:extLst>
+      <p:ext uri="{BB962C8B-B14F-4D97-AF65-F5344CB8AC3E}">
+        <p14:creationId xmlns:p14="http://schemas.microsoft.com/office/powerpoint/2010/main" val="956588179"/>
+      </p:ext>
+    </p:extLst>
+  </p:cSld>
+  <p:clrMapOvr>
+    <a:masterClrMapping/>
+  </p:clrMapOvr>
+</p:sld>
+</file>
+
+<file path=ppt/slides/slide6.xml><?xml version="1.0" encoding="utf-8"?>
 <p:sld xmlns:a="http://schemas.openxmlformats.org/drawingml/2006/main" xmlns:r="http://schemas.openxmlformats.org/officeDocument/2006/relationships" xmlns:p="http://schemas.openxmlformats.org/presentationml/2006/main">
   <p:cSld>
     <p:spTree>
@@ -5605,7 +6054,7 @@
 </p:sld>
 </file>
 
-<file path=ppt/slides/slide5.xml><?xml version="1.0" encoding="utf-8"?>
+<file path=ppt/slides/slide7.xml><?xml version="1.0" encoding="utf-8"?>
 <p:sld xmlns:a="http://schemas.openxmlformats.org/drawingml/2006/main" xmlns:r="http://schemas.openxmlformats.org/officeDocument/2006/relationships" xmlns:p="http://schemas.openxmlformats.org/presentationml/2006/main">
   <p:cSld>
     <p:spTree>
@@ -6107,7 +6556,7 @@
 </p:sld>
 </file>
 
-<file path=ppt/slides/slide6.xml><?xml version="1.0" encoding="utf-8"?>
+<file path=ppt/slides/slide8.xml><?xml version="1.0" encoding="utf-8"?>
 <p:sld xmlns:a="http://schemas.openxmlformats.org/drawingml/2006/main" xmlns:r="http://schemas.openxmlformats.org/officeDocument/2006/relationships" xmlns:p="http://schemas.openxmlformats.org/presentationml/2006/main">
   <p:cSld>
     <p:spTree>
@@ -6184,7 +6633,7 @@
 </p:sld>
 </file>
 
-<file path=ppt/slides/slide7.xml><?xml version="1.0" encoding="utf-8"?>
+<file path=ppt/slides/slide9.xml><?xml version="1.0" encoding="utf-8"?>
 <p:sld xmlns:a="http://schemas.openxmlformats.org/drawingml/2006/main" xmlns:r="http://schemas.openxmlformats.org/officeDocument/2006/relationships" xmlns:p="http://schemas.openxmlformats.org/presentationml/2006/main">
   <p:cSld>
     <p:spTree>

</xml_diff>